<commit_message>
Uploaded an updated version
</commit_message>
<xml_diff>
--- a/ETL_Project.pptx
+++ b/ETL_Project.pptx
@@ -127,7 +127,7 @@
   <pc:docChgLst>
     <pc:chgData name="David Moorman" userId="c3935223f037ddc6" providerId="LiveId" clId="{B3DE49A1-401B-462F-BE3F-D82EFF30D16D}"/>
     <pc:docChg chg="undo custSel addSld delSld modSld sldOrd">
-      <pc:chgData name="David Moorman" userId="c3935223f037ddc6" providerId="LiveId" clId="{B3DE49A1-401B-462F-BE3F-D82EFF30D16D}" dt="2020-09-09T01:21:27.629" v="2859" actId="14100"/>
+      <pc:chgData name="David Moorman" userId="c3935223f037ddc6" providerId="LiveId" clId="{B3DE49A1-401B-462F-BE3F-D82EFF30D16D}" dt="2020-09-09T01:35:03.310" v="2917" actId="20577"/>
       <pc:docMkLst>
         <pc:docMk/>
       </pc:docMkLst>
@@ -305,7 +305,7 @@
         </pc:picChg>
       </pc:sldChg>
       <pc:sldChg chg="addSp delSp modSp new mod">
-        <pc:chgData name="David Moorman" userId="c3935223f037ddc6" providerId="LiveId" clId="{B3DE49A1-401B-462F-BE3F-D82EFF30D16D}" dt="2020-09-09T00:28:24.126" v="2712" actId="20577"/>
+        <pc:chgData name="David Moorman" userId="c3935223f037ddc6" providerId="LiveId" clId="{B3DE49A1-401B-462F-BE3F-D82EFF30D16D}" dt="2020-09-09T01:27:15.250" v="2910" actId="20577"/>
         <pc:sldMkLst>
           <pc:docMk/>
           <pc:sldMk cId="1980056081" sldId="259"/>
@@ -327,7 +327,7 @@
           </ac:spMkLst>
         </pc:spChg>
         <pc:spChg chg="mod">
-          <ac:chgData name="David Moorman" userId="c3935223f037ddc6" providerId="LiveId" clId="{B3DE49A1-401B-462F-BE3F-D82EFF30D16D}" dt="2020-09-09T00:28:24.126" v="2712" actId="20577"/>
+          <ac:chgData name="David Moorman" userId="c3935223f037ddc6" providerId="LiveId" clId="{B3DE49A1-401B-462F-BE3F-D82EFF30D16D}" dt="2020-09-09T01:27:15.250" v="2910" actId="20577"/>
           <ac:spMkLst>
             <pc:docMk/>
             <pc:sldMk cId="1980056081" sldId="259"/>
@@ -532,7 +532,7 @@
         </pc:spChg>
       </pc:sldChg>
       <pc:sldChg chg="modSp new mod ord">
-        <pc:chgData name="David Moorman" userId="c3935223f037ddc6" providerId="LiveId" clId="{B3DE49A1-401B-462F-BE3F-D82EFF30D16D}" dt="2020-09-08T23:56:32.257" v="1712"/>
+        <pc:chgData name="David Moorman" userId="c3935223f037ddc6" providerId="LiveId" clId="{B3DE49A1-401B-462F-BE3F-D82EFF30D16D}" dt="2020-09-09T01:35:03.310" v="2917" actId="20577"/>
         <pc:sldMkLst>
           <pc:docMk/>
           <pc:sldMk cId="197938852" sldId="264"/>
@@ -546,7 +546,7 @@
           </ac:spMkLst>
         </pc:spChg>
         <pc:spChg chg="mod">
-          <ac:chgData name="David Moorman" userId="c3935223f037ddc6" providerId="LiveId" clId="{B3DE49A1-401B-462F-BE3F-D82EFF30D16D}" dt="2020-09-08T22:53:00.501" v="432" actId="20577"/>
+          <ac:chgData name="David Moorman" userId="c3935223f037ddc6" providerId="LiveId" clId="{B3DE49A1-401B-462F-BE3F-D82EFF30D16D}" dt="2020-09-09T01:35:03.310" v="2917" actId="20577"/>
           <ac:spMkLst>
             <pc:docMk/>
             <pc:sldMk cId="197938852" sldId="264"/>
@@ -6517,7 +6517,7 @@
           <a:p>
             <a:r>
               <a:rPr lang="en-US" dirty="0"/>
-              <a:t>Or, because the average disposable income is higher is it used on things like cappuccinos and wine?</a:t>
+              <a:t>Or, because the average disposable income is higher and is used on things like cappuccinos and wine?</a:t>
             </a:r>
           </a:p>
         </p:txBody>
@@ -7636,7 +7636,7 @@
                 <a:effectLst/>
                 <a:latin typeface="Open Sans"/>
               </a:rPr>
-              <a:t>Renamed and sorte</a:t>
+              <a:t>Cleaned,</a:t>
             </a:r>
             <a:r>
               <a:rPr lang="en-US" dirty="0">
@@ -7645,7 +7645,26 @@
                 </a:solidFill>
                 <a:latin typeface="Open Sans"/>
               </a:rPr>
-              <a:t>d the columns</a:t>
+              <a:t> r</a:t>
+            </a:r>
+            <a:r>
+              <a:rPr lang="en-US" b="0" i="0" u="none" strike="noStrike" dirty="0">
+                <a:solidFill>
+                  <a:srgbClr val="243641"/>
+                </a:solidFill>
+                <a:effectLst/>
+                <a:latin typeface="Open Sans"/>
+              </a:rPr>
+              <a:t>e-named and sorte</a:t>
+            </a:r>
+            <a:r>
+              <a:rPr lang="en-US" dirty="0">
+                <a:solidFill>
+                  <a:srgbClr val="243641"/>
+                </a:solidFill>
+                <a:latin typeface="Open Sans"/>
+              </a:rPr>
+              <a:t>d the columns.  Set index to city.</a:t>
             </a:r>
           </a:p>
           <a:p>

</xml_diff>

<commit_message>
Uploaded latest final version
</commit_message>
<xml_diff>
--- a/ETL_Project.pptx
+++ b/ETL_Project.pptx
@@ -127,7 +127,7 @@
   <pc:docChgLst>
     <pc:chgData name="David Moorman" userId="c3935223f037ddc6" providerId="LiveId" clId="{B3DE49A1-401B-462F-BE3F-D82EFF30D16D}"/>
     <pc:docChg chg="undo custSel addSld delSld modSld sldOrd">
-      <pc:chgData name="David Moorman" userId="c3935223f037ddc6" providerId="LiveId" clId="{B3DE49A1-401B-462F-BE3F-D82EFF30D16D}" dt="2020-09-09T01:35:03.310" v="2917" actId="20577"/>
+      <pc:chgData name="David Moorman" userId="c3935223f037ddc6" providerId="LiveId" clId="{B3DE49A1-401B-462F-BE3F-D82EFF30D16D}" dt="2020-09-10T15:07:00.761" v="2926" actId="20577"/>
       <pc:docMkLst>
         <pc:docMk/>
       </pc:docMkLst>
@@ -430,7 +430,7 @@
         </pc:spChg>
       </pc:sldChg>
       <pc:sldChg chg="addSp delSp modSp add mod">
-        <pc:chgData name="David Moorman" userId="c3935223f037ddc6" providerId="LiveId" clId="{B3DE49A1-401B-462F-BE3F-D82EFF30D16D}" dt="2020-09-09T01:18:31.392" v="2791" actId="1076"/>
+        <pc:chgData name="David Moorman" userId="c3935223f037ddc6" providerId="LiveId" clId="{B3DE49A1-401B-462F-BE3F-D82EFF30D16D}" dt="2020-09-10T15:07:00.761" v="2926" actId="20577"/>
         <pc:sldMkLst>
           <pc:docMk/>
           <pc:sldMk cId="1702673776" sldId="262"/>
@@ -452,7 +452,7 @@
           </ac:spMkLst>
         </pc:spChg>
         <pc:spChg chg="mod">
-          <ac:chgData name="David Moorman" userId="c3935223f037ddc6" providerId="LiveId" clId="{B3DE49A1-401B-462F-BE3F-D82EFF30D16D}" dt="2020-09-08T23:39:50.952" v="1540" actId="14100"/>
+          <ac:chgData name="David Moorman" userId="c3935223f037ddc6" providerId="LiveId" clId="{B3DE49A1-401B-462F-BE3F-D82EFF30D16D}" dt="2020-09-10T15:07:00.761" v="2926" actId="20577"/>
           <ac:spMkLst>
             <pc:docMk/>
             <pc:sldMk cId="1702673776" sldId="262"/>
@@ -1112,7 +1112,7 @@
           <a:p>
             <a:fld id="{403CB87E-4591-47A1-9046-CF63F17215EF}" type="datetime2">
               <a:rPr lang="en-US" smtClean="0"/>
-              <a:t>Tuesday, September 08, 2020</a:t>
+              <a:t>Thursday, September 10, 2020</a:t>
             </a:fld>
             <a:endParaRPr lang="en-US" dirty="0"/>
           </a:p>
@@ -1553,7 +1553,7 @@
             <a:fld id="{E8352ED3-3C46-4C9A-9738-67B2D875E7E2}" type="datetime2">
               <a:rPr lang="en-US" smtClean="0"/>
               <a:pPr/>
-              <a:t>Tuesday, September 08, 2020</a:t>
+              <a:t>Thursday, September 10, 2020</a:t>
             </a:fld>
             <a:endParaRPr lang="en-US" dirty="0"/>
           </a:p>
@@ -1810,7 +1810,7 @@
             <a:fld id="{E8352ED3-3C46-4C9A-9738-67B2D875E7E2}" type="datetime2">
               <a:rPr lang="en-US" smtClean="0"/>
               <a:pPr/>
-              <a:t>Tuesday, September 08, 2020</a:t>
+              <a:t>Thursday, September 10, 2020</a:t>
             </a:fld>
             <a:endParaRPr lang="en-US" dirty="0"/>
           </a:p>
@@ -2125,7 +2125,7 @@
             <a:fld id="{E8352ED3-3C46-4C9A-9738-67B2D875E7E2}" type="datetime2">
               <a:rPr lang="en-US" smtClean="0"/>
               <a:pPr/>
-              <a:t>Tuesday, September 08, 2020</a:t>
+              <a:t>Thursday, September 10, 2020</a:t>
             </a:fld>
             <a:endParaRPr lang="en-US" dirty="0"/>
           </a:p>
@@ -2450,7 +2450,7 @@
             <a:fld id="{E8352ED3-3C46-4C9A-9738-67B2D875E7E2}" type="datetime2">
               <a:rPr lang="en-US" smtClean="0"/>
               <a:pPr/>
-              <a:t>Tuesday, September 08, 2020</a:t>
+              <a:t>Thursday, September 10, 2020</a:t>
             </a:fld>
             <a:endParaRPr lang="en-US" dirty="0"/>
           </a:p>
@@ -2759,7 +2759,7 @@
             <a:fld id="{E8352ED3-3C46-4C9A-9738-67B2D875E7E2}" type="datetime2">
               <a:rPr lang="en-US" smtClean="0"/>
               <a:pPr/>
-              <a:t>Tuesday, September 08, 2020</a:t>
+              <a:t>Thursday, September 10, 2020</a:t>
             </a:fld>
             <a:endParaRPr lang="en-US" dirty="0"/>
           </a:p>
@@ -3133,7 +3133,7 @@
             <a:fld id="{E8352ED3-3C46-4C9A-9738-67B2D875E7E2}" type="datetime2">
               <a:rPr lang="en-US" smtClean="0"/>
               <a:pPr/>
-              <a:t>Tuesday, September 08, 2020</a:t>
+              <a:t>Thursday, September 10, 2020</a:t>
             </a:fld>
             <a:endParaRPr lang="en-US" dirty="0"/>
           </a:p>
@@ -3313,7 +3313,7 @@
           <a:p>
             <a:fld id="{2FA17F0E-8070-4DFE-A821-9A699EDBAD7E}" type="datetime2">
               <a:rPr lang="en-US" smtClean="0"/>
-              <a:t>Tuesday, September 08, 2020</a:t>
+              <a:t>Thursday, September 10, 2020</a:t>
             </a:fld>
             <a:endParaRPr lang="en-US"/>
           </a:p>
@@ -3497,7 +3497,7 @@
           <a:p>
             <a:fld id="{D88D34AE-C7BF-46E5-A968-01C6641F6476}" type="datetime2">
               <a:rPr lang="en-US" smtClean="0"/>
-              <a:t>Tuesday, September 08, 2020</a:t>
+              <a:t>Thursday, September 10, 2020</a:t>
             </a:fld>
             <a:endParaRPr lang="en-US"/>
           </a:p>
@@ -3671,7 +3671,7 @@
           <a:p>
             <a:fld id="{F33DE70B-B772-416E-A790-995760B1742E}" type="datetime2">
               <a:rPr lang="en-US" smtClean="0"/>
-              <a:t>Tuesday, September 08, 2020</a:t>
+              <a:t>Thursday, September 10, 2020</a:t>
             </a:fld>
             <a:endParaRPr lang="en-US" dirty="0"/>
           </a:p>
@@ -3926,7 +3926,7 @@
           <a:p>
             <a:fld id="{76760CDE-A6F1-4138-AF12-ED09E8E5FB6B}" type="datetime2">
               <a:rPr lang="en-US" smtClean="0"/>
-              <a:t>Tuesday, September 08, 2020</a:t>
+              <a:t>Thursday, September 10, 2020</a:t>
             </a:fld>
             <a:endParaRPr lang="en-US"/>
           </a:p>
@@ -4166,7 +4166,7 @@
           <a:p>
             <a:fld id="{DB15F8B1-DB7B-4D28-A97D-40FB2DD1EF78}" type="datetime2">
               <a:rPr lang="en-US" smtClean="0"/>
-              <a:t>Tuesday, September 08, 2020</a:t>
+              <a:t>Thursday, September 10, 2020</a:t>
             </a:fld>
             <a:endParaRPr lang="en-US"/>
           </a:p>
@@ -4552,7 +4552,7 @@
           <a:p>
             <a:fld id="{14039161-23B8-4738-9069-73EBE8884FDD}" type="datetime2">
               <a:rPr lang="en-US" smtClean="0"/>
-              <a:t>Tuesday, September 08, 2020</a:t>
+              <a:t>Thursday, September 10, 2020</a:t>
             </a:fld>
             <a:endParaRPr lang="en-US"/>
           </a:p>
@@ -4674,7 +4674,7 @@
           <a:p>
             <a:fld id="{FA994D44-7693-499F-AC6C-11696134FE3F}" type="datetime2">
               <a:rPr lang="en-US" smtClean="0"/>
-              <a:t>Tuesday, September 08, 2020</a:t>
+              <a:t>Thursday, September 10, 2020</a:t>
             </a:fld>
             <a:endParaRPr lang="en-US"/>
           </a:p>
@@ -4773,7 +4773,7 @@
           <a:p>
             <a:fld id="{363AF2AE-472C-4EF3-ABB2-24BAA9AE3CF7}" type="datetime2">
               <a:rPr lang="en-US" smtClean="0"/>
-              <a:t>Tuesday, September 08, 2020</a:t>
+              <a:t>Thursday, September 10, 2020</a:t>
             </a:fld>
             <a:endParaRPr lang="en-US"/>
           </a:p>
@@ -5032,7 +5032,7 @@
           <a:p>
             <a:fld id="{EAEA162C-A7C1-4263-9453-1BAFF8C39559}" type="datetime2">
               <a:rPr lang="en-US" smtClean="0"/>
-              <a:t>Tuesday, September 08, 2020</a:t>
+              <a:t>Thursday, September 10, 2020</a:t>
             </a:fld>
             <a:endParaRPr lang="en-US"/>
           </a:p>
@@ -5319,7 +5319,7 @@
           <a:p>
             <a:fld id="{64DF6793-3458-4587-8168-65F0C37A92D2}" type="datetime2">
               <a:rPr lang="en-US" smtClean="0"/>
-              <a:t>Tuesday, September 08, 2020</a:t>
+              <a:t>Thursday, September 10, 2020</a:t>
             </a:fld>
             <a:endParaRPr lang="en-US"/>
           </a:p>
@@ -5730,7 +5730,7 @@
             <a:fld id="{E8352ED3-3C46-4C9A-9738-67B2D875E7E2}" type="datetime2">
               <a:rPr lang="en-US" smtClean="0"/>
               <a:pPr/>
-              <a:t>Tuesday, September 08, 2020</a:t>
+              <a:t>Thursday, September 10, 2020</a:t>
             </a:fld>
             <a:endParaRPr lang="en-US" dirty="0"/>
           </a:p>
@@ -8997,7 +8997,44 @@
                 </a:solidFill>
                 <a:latin typeface="Open Sans"/>
               </a:rPr>
-              <a:t>Merged_cq</a:t>
+              <a:t>merged_cq</a:t>
+            </a:r>
+            <a:endParaRPr lang="en-US" sz="1800" dirty="0">
+              <a:solidFill>
+                <a:srgbClr val="243641"/>
+              </a:solidFill>
+              <a:latin typeface="Open Sans"/>
+            </a:endParaRPr>
+          </a:p>
+          <a:p>
+            <a:pPr marL="742950" indent="-285750">
+              <a:spcBef>
+                <a:spcPts val="1000"/>
+              </a:spcBef>
+              <a:spcAft>
+                <a:spcPts val="0"/>
+              </a:spcAft>
+              <a:buFont typeface="Arial" panose="020B0604020202020204" pitchFamily="34" charset="0"/>
+              <a:buChar char="•"/>
+            </a:pPr>
+            <a:r>
+              <a:rPr lang="en-US" sz="1800" dirty="0" err="1">
+                <a:solidFill>
+                  <a:srgbClr val="243641"/>
+                </a:solidFill>
+                <a:latin typeface="Open Sans"/>
+              </a:rPr>
+              <a:t>m</a:t>
+            </a:r>
+            <a:r>
+              <a:rPr lang="en-US" sz="1800" b="0" dirty="0" err="1">
+                <a:solidFill>
+                  <a:srgbClr val="243641"/>
+                </a:solidFill>
+                <a:effectLst/>
+                <a:latin typeface="Open Sans"/>
+              </a:rPr>
+              <a:t>_p</a:t>
             </a:r>
             <a:endParaRPr lang="en-US" sz="1800" b="0" dirty="0">
               <a:effectLst/>

</xml_diff>

<commit_message>
Final presentation version uploaded with Slide 8 revision
</commit_message>
<xml_diff>
--- a/ETL_Project.pptx
+++ b/ETL_Project.pptx
@@ -127,7 +127,7 @@
   <pc:docChgLst>
     <pc:chgData name="David Moorman" userId="c3935223f037ddc6" providerId="LiveId" clId="{B3DE49A1-401B-462F-BE3F-D82EFF30D16D}"/>
     <pc:docChg chg="undo custSel addSld delSld modSld sldOrd">
-      <pc:chgData name="David Moorman" userId="c3935223f037ddc6" providerId="LiveId" clId="{B3DE49A1-401B-462F-BE3F-D82EFF30D16D}" dt="2020-09-10T15:07:00.761" v="2926" actId="20577"/>
+      <pc:chgData name="David Moorman" userId="c3935223f037ddc6" providerId="LiveId" clId="{B3DE49A1-401B-462F-BE3F-D82EFF30D16D}" dt="2020-09-10T22:01:58.987" v="2938" actId="1076"/>
       <pc:docMkLst>
         <pc:docMk/>
       </pc:docMkLst>
@@ -430,7 +430,7 @@
         </pc:spChg>
       </pc:sldChg>
       <pc:sldChg chg="addSp delSp modSp add mod">
-        <pc:chgData name="David Moorman" userId="c3935223f037ddc6" providerId="LiveId" clId="{B3DE49A1-401B-462F-BE3F-D82EFF30D16D}" dt="2020-09-10T15:07:00.761" v="2926" actId="20577"/>
+        <pc:chgData name="David Moorman" userId="c3935223f037ddc6" providerId="LiveId" clId="{B3DE49A1-401B-462F-BE3F-D82EFF30D16D}" dt="2020-09-10T22:01:58.987" v="2938" actId="1076"/>
         <pc:sldMkLst>
           <pc:docMk/>
           <pc:sldMk cId="1702673776" sldId="262"/>
@@ -467,6 +467,14 @@
             <ac:spMk id="8" creationId="{50A5A0BE-F6E0-41A9-A762-D5DC67A3D00D}"/>
           </ac:spMkLst>
         </pc:spChg>
+        <pc:picChg chg="add mod">
+          <ac:chgData name="David Moorman" userId="c3935223f037ddc6" providerId="LiveId" clId="{B3DE49A1-401B-462F-BE3F-D82EFF30D16D}" dt="2020-09-10T22:01:58.987" v="2938" actId="1076"/>
+          <ac:picMkLst>
+            <pc:docMk/>
+            <pc:sldMk cId="1702673776" sldId="262"/>
+            <ac:picMk id="5" creationId="{A0247DC5-47A6-4F89-83DE-5F07657B0F31}"/>
+          </ac:picMkLst>
+        </pc:picChg>
         <pc:picChg chg="add del mod">
           <ac:chgData name="David Moorman" userId="c3935223f037ddc6" providerId="LiveId" clId="{B3DE49A1-401B-462F-BE3F-D82EFF30D16D}" dt="2020-09-08T23:19:57.852" v="1212" actId="478"/>
           <ac:picMkLst>
@@ -491,16 +499,16 @@
             <ac:picMk id="12" creationId="{578169CB-60C5-4AB2-9AD9-C9DFF48859F9}"/>
           </ac:picMkLst>
         </pc:picChg>
-        <pc:picChg chg="add mod">
-          <ac:chgData name="David Moorman" userId="c3935223f037ddc6" providerId="LiveId" clId="{B3DE49A1-401B-462F-BE3F-D82EFF30D16D}" dt="2020-09-09T01:18:31.392" v="2791" actId="1076"/>
+        <pc:picChg chg="add del mod">
+          <ac:chgData name="David Moorman" userId="c3935223f037ddc6" providerId="LiveId" clId="{B3DE49A1-401B-462F-BE3F-D82EFF30D16D}" dt="2020-09-10T22:01:37.675" v="2929" actId="478"/>
           <ac:picMkLst>
             <pc:docMk/>
             <pc:sldMk cId="1702673776" sldId="262"/>
             <ac:picMk id="14" creationId="{4FD25C3A-183F-4B78-AC80-A13D5429CC90}"/>
           </ac:picMkLst>
         </pc:picChg>
-        <pc:picChg chg="add mod">
-          <ac:chgData name="David Moorman" userId="c3935223f037ddc6" providerId="LiveId" clId="{B3DE49A1-401B-462F-BE3F-D82EFF30D16D}" dt="2020-09-09T01:18:26.735" v="2790" actId="1076"/>
+        <pc:picChg chg="add del mod">
+          <ac:chgData name="David Moorman" userId="c3935223f037ddc6" providerId="LiveId" clId="{B3DE49A1-401B-462F-BE3F-D82EFF30D16D}" dt="2020-09-10T22:01:36.638" v="2928" actId="478"/>
           <ac:picMkLst>
             <pc:docMk/>
             <pc:sldMk cId="1702673776" sldId="262"/>
@@ -9090,10 +9098,10 @@
       </p:sp>
       <p:pic>
         <p:nvPicPr>
-          <p:cNvPr id="14" name="Picture 13">
+          <p:cNvPr id="5" name="Picture 4">
             <a:extLst>
               <a:ext uri="{FF2B5EF4-FFF2-40B4-BE49-F238E27FC236}">
-                <a16:creationId xmlns:a16="http://schemas.microsoft.com/office/drawing/2014/main" id="{4FD25C3A-183F-4B78-AC80-A13D5429CC90}"/>
+                <a16:creationId xmlns:a16="http://schemas.microsoft.com/office/drawing/2014/main" id="{A0247DC5-47A6-4F89-83DE-5F07657B0F31}"/>
               </a:ext>
             </a:extLst>
           </p:cNvPr>
@@ -9116,44 +9124,8 @@
         </p:blipFill>
         <p:spPr>
           <a:xfrm>
-            <a:off x="307202" y="1371600"/>
-            <a:ext cx="6133163" cy="788651"/>
-          </a:xfrm>
-          <a:prstGeom prst="rect">
-            <a:avLst/>
-          </a:prstGeom>
-        </p:spPr>
-      </p:pic>
-      <p:pic>
-        <p:nvPicPr>
-          <p:cNvPr id="16" name="Picture 15">
-            <a:extLst>
-              <a:ext uri="{FF2B5EF4-FFF2-40B4-BE49-F238E27FC236}">
-                <a16:creationId xmlns:a16="http://schemas.microsoft.com/office/drawing/2014/main" id="{F7466791-1352-4B77-83B3-691D03507877}"/>
-              </a:ext>
-            </a:extLst>
-          </p:cNvPr>
-          <p:cNvPicPr>
-            <a:picLocks noChangeAspect="1"/>
-          </p:cNvPicPr>
-          <p:nvPr/>
-        </p:nvPicPr>
-        <p:blipFill>
-          <a:blip r:embed="rId3">
-            <a:extLst>
-              <a:ext uri="{28A0092B-C50C-407E-A947-70E740481C1C}">
-                <a14:useLocalDpi xmlns:a14="http://schemas.microsoft.com/office/drawing/2010/main" val="0"/>
-              </a:ext>
-            </a:extLst>
-          </a:blip>
-          <a:stretch>
-            <a:fillRect/>
-          </a:stretch>
-        </p:blipFill>
-        <p:spPr>
-          <a:xfrm>
-            <a:off x="240198" y="2875366"/>
-            <a:ext cx="6267173" cy="1943747"/>
+            <a:off x="233779" y="1482549"/>
+            <a:ext cx="6637538" cy="3892902"/>
           </a:xfrm>
           <a:prstGeom prst="rect">
             <a:avLst/>

</xml_diff>